<commit_message>
basic stats python update
</commit_message>
<xml_diff>
--- a/course_material/week_08/week_08_presentation.pptx
+++ b/course_material/week_08/week_08_presentation.pptx
@@ -16,8 +16,8 @@
     <p:sldId id="304" r:id="rId7"/>
     <p:sldId id="302" r:id="rId8"/>
     <p:sldId id="303" r:id="rId9"/>
-    <p:sldId id="271" r:id="rId10"/>
-    <p:sldId id="285" r:id="rId11"/>
+    <p:sldId id="285" r:id="rId10"/>
+    <p:sldId id="271" r:id="rId11"/>
   </p:sldIdLst>
   <p:sldSz cx="12192000" cy="6858000"/>
   <p:notesSz cx="6858000" cy="9144000"/>
@@ -1832,7 +1832,7 @@
           <a:p>
             <a:fld id="{5CF9EFDB-215C-4120-ADCB-EAD745B7163E}" type="datetimeFigureOut">
               <a:rPr lang="en-US" smtClean="0"/>
-              <a:t>4/19/2021</a:t>
+              <a:t>4/21/2021</a:t>
             </a:fld>
             <a:endParaRPr lang="en-US"/>
           </a:p>
@@ -2293,7 +2293,7 @@
           <a:p>
             <a:fld id="{ACF1A1B0-862D-4909-A7DB-D8ADA062DFCA}" type="datetimeFigureOut">
               <a:rPr lang="en-US" dirty="0"/>
-              <a:t>4/19/2021</a:t>
+              <a:t>4/21/2021</a:t>
             </a:fld>
             <a:endParaRPr lang="en-US"/>
           </a:p>
@@ -2516,7 +2516,7 @@
           <a:p>
             <a:fld id="{7B156144-9CB7-4E3A-B87E-A382F9BE05EF}" type="datetimeFigureOut">
               <a:rPr lang="en-US" dirty="0"/>
-              <a:t>4/19/2021</a:t>
+              <a:t>4/21/2021</a:t>
             </a:fld>
             <a:endParaRPr lang="en-US"/>
           </a:p>
@@ -2694,7 +2694,7 @@
           <a:p>
             <a:fld id="{2643D55F-46AB-4791-9172-4FA8DD3A6A9C}" type="datetimeFigureOut">
               <a:rPr lang="en-US" dirty="0"/>
-              <a:t>4/19/2021</a:t>
+              <a:t>4/21/2021</a:t>
             </a:fld>
             <a:endParaRPr lang="en-US"/>
           </a:p>
@@ -2862,7 +2862,7 @@
           <a:p>
             <a:fld id="{58026881-8A08-449C-8D73-E5F201F814C1}" type="datetimeFigureOut">
               <a:rPr lang="en-US" dirty="0"/>
-              <a:t>4/19/2021</a:t>
+              <a:t>4/21/2021</a:t>
             </a:fld>
             <a:endParaRPr lang="en-US"/>
           </a:p>
@@ -3152,7 +3152,7 @@
           <a:p>
             <a:fld id="{1BEB5A5E-0C07-4E93-A112-D37B4D166B30}" type="datetimeFigureOut">
               <a:rPr lang="en-US" dirty="0"/>
-              <a:t>4/19/2021</a:t>
+              <a:t>4/21/2021</a:t>
             </a:fld>
             <a:endParaRPr lang="en-US"/>
           </a:p>
@@ -3475,7 +3475,7 @@
           <a:p>
             <a:fld id="{9E1F71C5-DC57-4358-A1EA-30C08AF6E3C5}" type="datetimeFigureOut">
               <a:rPr lang="en-US" dirty="0"/>
-              <a:t>4/19/2021</a:t>
+              <a:t>4/21/2021</a:t>
             </a:fld>
             <a:endParaRPr lang="en-US"/>
           </a:p>
@@ -3884,7 +3884,7 @@
           <a:p>
             <a:fld id="{12571DBA-DE60-4731-B773-47AAA185C143}" type="datetimeFigureOut">
               <a:rPr lang="en-US" dirty="0"/>
-              <a:t>4/19/2021</a:t>
+              <a:t>4/21/2021</a:t>
             </a:fld>
             <a:endParaRPr lang="en-US"/>
           </a:p>
@@ -4001,7 +4001,7 @@
           <a:p>
             <a:fld id="{4F170639-886C-4FCF-9EAB-ABB5DA3F3F4A}" type="datetimeFigureOut">
               <a:rPr lang="en-US" dirty="0"/>
-              <a:t>4/19/2021</a:t>
+              <a:t>4/21/2021</a:t>
             </a:fld>
             <a:endParaRPr lang="en-US"/>
           </a:p>
@@ -4096,7 +4096,7 @@
           <a:p>
             <a:fld id="{34C4A628-C83B-4C66-83F4-1711CE3738FD}" type="datetimeFigureOut">
               <a:rPr lang="en-US" dirty="0"/>
-              <a:t>4/19/2021</a:t>
+              <a:t>4/21/2021</a:t>
             </a:fld>
             <a:endParaRPr lang="en-US"/>
           </a:p>
@@ -4381,7 +4381,7 @@
           <a:p>
             <a:fld id="{B88C1D73-9400-43CA-A37F-F9B7D00DE14C}" type="datetimeFigureOut">
               <a:rPr lang="en-US" dirty="0"/>
-              <a:t>4/19/2021</a:t>
+              <a:t>4/21/2021</a:t>
             </a:fld>
             <a:endParaRPr lang="en-US"/>
           </a:p>
@@ -4653,7 +4653,7 @@
           <a:p>
             <a:fld id="{188B7711-B905-4633-B4D7-6F3A49A2E7D9}" type="datetimeFigureOut">
               <a:rPr lang="en-US" dirty="0"/>
-              <a:t>4/19/2021</a:t>
+              <a:t>4/21/2021</a:t>
             </a:fld>
             <a:endParaRPr lang="en-US"/>
           </a:p>
@@ -4903,7 +4903,7 @@
             <a:fld id="{89C235CF-BDA2-4E7E-8BBD-350479985E74}" type="datetimeFigureOut">
               <a:rPr lang="en-US" dirty="0"/>
               <a:pPr/>
-              <a:t>4/19/2021</a:t>
+              <a:t>4/21/2021</a:t>
             </a:fld>
             <a:endParaRPr lang="en-US"/>
           </a:p>
@@ -5466,10 +5466,10 @@
       </p:grpSpPr>
       <p:sp>
         <p:nvSpPr>
-          <p:cNvPr id="4" name="Title 3">
+          <p:cNvPr id="2" name="Title 1">
             <a:extLst>
               <a:ext uri="{FF2B5EF4-FFF2-40B4-BE49-F238E27FC236}">
-                <a16:creationId xmlns:a16="http://schemas.microsoft.com/office/drawing/2014/main" id="{297BDE90-8DCF-4039-AB05-11C3F09C3813}"/>
+                <a16:creationId xmlns:a16="http://schemas.microsoft.com/office/drawing/2014/main" id="{1E4C2A9E-C0F4-4E0F-AFFE-27A0CF3625B5}"/>
               </a:ext>
             </a:extLst>
           </p:cNvPr>
@@ -5477,7 +5477,7 @@
             <a:spLocks noGrp="1"/>
           </p:cNvSpPr>
           <p:nvPr>
-            <p:ph type="ctrTitle"/>
+            <p:ph type="title"/>
           </p:nvPr>
         </p:nvSpPr>
         <p:spPr/>
@@ -5487,17 +5487,17 @@
           <a:p>
             <a:r>
               <a:rPr lang="en-US" dirty="0"/>
-              <a:t>Break (15 Minutes)</a:t>
-            </a:r>
-          </a:p>
-        </p:txBody>
-      </p:sp>
-      <p:sp>
-        <p:nvSpPr>
-          <p:cNvPr id="5" name="Subtitle 4">
+              <a:t>Week 8 Group Exercise</a:t>
+            </a:r>
+          </a:p>
+        </p:txBody>
+      </p:sp>
+      <p:sp>
+        <p:nvSpPr>
+          <p:cNvPr id="3" name="Content Placeholder 2">
             <a:extLst>
               <a:ext uri="{FF2B5EF4-FFF2-40B4-BE49-F238E27FC236}">
-                <a16:creationId xmlns:a16="http://schemas.microsoft.com/office/drawing/2014/main" id="{AE43AD4D-53BE-4D90-B4EE-A313556AC5A9}"/>
+                <a16:creationId xmlns:a16="http://schemas.microsoft.com/office/drawing/2014/main" id="{D327E97E-AE1B-400B-A18F-C9C7C854DCEB}"/>
               </a:ext>
             </a:extLst>
           </p:cNvPr>
@@ -5505,40 +5505,35 @@
             <a:spLocks noGrp="1"/>
           </p:cNvSpPr>
           <p:nvPr>
-            <p:ph type="subTitle" idx="1"/>
+            <p:ph idx="1"/>
           </p:nvPr>
         </p:nvSpPr>
         <p:spPr/>
         <p:txBody>
-          <a:bodyPr/>
+          <a:bodyPr vert="horz" lIns="91440" tIns="45720" rIns="91440" bIns="45720" rtlCol="0" anchor="t">
+            <a:normAutofit/>
+          </a:bodyPr>
           <a:lstStyle/>
           <a:p>
             <a:r>
-              <a:rPr lang="en-US" dirty="0"/>
-              <a:t>Attendance word: </a:t>
-            </a:r>
-            <a:r>
-              <a:rPr lang="en-US" b="0" i="0" dirty="0" err="1">
-                <a:solidFill>
-                  <a:schemeClr val="tx1"/>
-                </a:solidFill>
-                <a:effectLst/>
-                <a:latin typeface="Slack-Lato"/>
-              </a:rPr>
-              <a:t>TopTechnologist</a:t>
-            </a:r>
-            <a:endParaRPr lang="en-US" dirty="0">
-              <a:solidFill>
-                <a:schemeClr val="tx1"/>
-              </a:solidFill>
-            </a:endParaRPr>
+              <a:rPr lang="en-US" spc="0" dirty="0"/>
+              <a:t>Once you finish and have submitted your exercise in Canvas via a </a:t>
+            </a:r>
+            <a:r>
+              <a:rPr lang="en-US" spc="0" dirty="0" err="1"/>
+              <a:t>github</a:t>
+            </a:r>
+            <a:r>
+              <a:rPr lang="en-US" spc="0" dirty="0"/>
+              <a:t> link, use the remaining time to work on your group project. </a:t>
+            </a:r>
           </a:p>
         </p:txBody>
       </p:sp>
     </p:spTree>
     <p:extLst>
       <p:ext uri="{BB962C8B-B14F-4D97-AF65-F5344CB8AC3E}">
-        <p14:creationId xmlns:p14="http://schemas.microsoft.com/office/powerpoint/2010/main" val="3877287137"/>
+        <p14:creationId xmlns:p14="http://schemas.microsoft.com/office/powerpoint/2010/main" val="656484464"/>
       </p:ext>
     </p:extLst>
   </p:cSld>
@@ -5588,7 +5583,7 @@
           <a:p>
             <a:r>
               <a:rPr lang="en-US" dirty="0"/>
-              <a:t>Warm-up	(10 minutes)</a:t>
+              <a:t>Warm-up	(5 minutes)</a:t>
             </a:r>
           </a:p>
         </p:txBody>
@@ -5618,6 +5613,27 @@
         <p:txBody>
           <a:bodyPr/>
           <a:lstStyle/>
+          <a:p>
+            <a:r>
+              <a:rPr lang="en-US" dirty="0"/>
+              <a:t>Write a python function that accepts three numbers and returns the max.</a:t>
+            </a:r>
+          </a:p>
+          <a:p>
+            <a:endParaRPr lang="en-US" dirty="0"/>
+          </a:p>
+          <a:p>
+            <a:endParaRPr lang="en-US" dirty="0"/>
+          </a:p>
+          <a:p>
+            <a:endParaRPr lang="en-US" dirty="0"/>
+          </a:p>
+          <a:p>
+            <a:endParaRPr lang="en-US" dirty="0"/>
+          </a:p>
+          <a:p>
+            <a:endParaRPr lang="en-US" dirty="0"/>
+          </a:p>
           <a:p>
             <a:endParaRPr lang="en-US" dirty="0"/>
           </a:p>
@@ -5728,7 +5744,13 @@
           <a:p>
             <a:r>
               <a:rPr lang="en-US" dirty="0"/>
-              <a:t>Basic Statistics in Python (30 mins)</a:t>
+              <a:t>Basic Statistics in Python (45 mins)</a:t>
+            </a:r>
+          </a:p>
+          <a:p>
+            <a:r>
+              <a:rPr lang="en-US" dirty="0"/>
+              <a:t>Break (15 mins)</a:t>
             </a:r>
           </a:p>
           <a:p>
@@ -5740,13 +5762,7 @@
           <a:p>
             <a:r>
               <a:rPr lang="en-US" dirty="0"/>
-              <a:t>Break (15 mins)</a:t>
-            </a:r>
-          </a:p>
-          <a:p>
-            <a:r>
-              <a:rPr lang="en-US" dirty="0"/>
-              <a:t>Work on Projects (75 mins)</a:t>
+              <a:t>Work on Projects (60 mins)</a:t>
             </a:r>
           </a:p>
           <a:p>
@@ -6046,7 +6062,7 @@
             <p:ph idx="1"/>
             <p:extLst>
               <p:ext uri="{D42A27DB-BD31-4B8C-83A1-F6EECF244321}">
-                <p14:modId xmlns:p14="http://schemas.microsoft.com/office/powerpoint/2010/main" val="3916887990"/>
+                <p14:modId xmlns:p14="http://schemas.microsoft.com/office/powerpoint/2010/main" val="1662951530"/>
               </p:ext>
             </p:extLst>
           </p:nvPr>
@@ -6197,7 +6213,7 @@
                     <a:p>
                       <a:r>
                         <a:rPr lang="en-US" dirty="0"/>
-                        <a:t>The same as interval except it has a concept of 0. Ex: concentration, Kelvin, weight</a:t>
+                        <a:t>The same as interval except it has a concept of 0. There are no negative numbers. Ex: concentration, Kelvin, weight</a:t>
                       </a:r>
                     </a:p>
                   </a:txBody>
@@ -6518,10 +6534,10 @@
       </p:grpSpPr>
       <p:sp>
         <p:nvSpPr>
-          <p:cNvPr id="2" name="Title 1">
+          <p:cNvPr id="4" name="Title 3">
             <a:extLst>
               <a:ext uri="{FF2B5EF4-FFF2-40B4-BE49-F238E27FC236}">
-                <a16:creationId xmlns:a16="http://schemas.microsoft.com/office/drawing/2014/main" id="{1E4C2A9E-C0F4-4E0F-AFFE-27A0CF3625B5}"/>
+                <a16:creationId xmlns:a16="http://schemas.microsoft.com/office/drawing/2014/main" id="{297BDE90-8DCF-4039-AB05-11C3F09C3813}"/>
               </a:ext>
             </a:extLst>
           </p:cNvPr>
@@ -6529,7 +6545,7 @@
             <a:spLocks noGrp="1"/>
           </p:cNvSpPr>
           <p:nvPr>
-            <p:ph type="title"/>
+            <p:ph type="ctrTitle"/>
           </p:nvPr>
         </p:nvSpPr>
         <p:spPr/>
@@ -6539,17 +6555,17 @@
           <a:p>
             <a:r>
               <a:rPr lang="en-US" dirty="0"/>
-              <a:t>Week 8 Group Exercise</a:t>
-            </a:r>
-          </a:p>
-        </p:txBody>
-      </p:sp>
-      <p:sp>
-        <p:nvSpPr>
-          <p:cNvPr id="3" name="Content Placeholder 2">
+              <a:t>Break (15 Minutes)</a:t>
+            </a:r>
+          </a:p>
+        </p:txBody>
+      </p:sp>
+      <p:sp>
+        <p:nvSpPr>
+          <p:cNvPr id="5" name="Subtitle 4">
             <a:extLst>
               <a:ext uri="{FF2B5EF4-FFF2-40B4-BE49-F238E27FC236}">
-                <a16:creationId xmlns:a16="http://schemas.microsoft.com/office/drawing/2014/main" id="{D327E97E-AE1B-400B-A18F-C9C7C854DCEB}"/>
+                <a16:creationId xmlns:a16="http://schemas.microsoft.com/office/drawing/2014/main" id="{AE43AD4D-53BE-4D90-B4EE-A313556AC5A9}"/>
               </a:ext>
             </a:extLst>
           </p:cNvPr>
@@ -6557,35 +6573,37 @@
             <a:spLocks noGrp="1"/>
           </p:cNvSpPr>
           <p:nvPr>
-            <p:ph idx="1"/>
+            <p:ph type="subTitle" idx="1"/>
           </p:nvPr>
         </p:nvSpPr>
         <p:spPr/>
         <p:txBody>
-          <a:bodyPr vert="horz" lIns="91440" tIns="45720" rIns="91440" bIns="45720" rtlCol="0" anchor="t">
-            <a:normAutofit/>
-          </a:bodyPr>
+          <a:bodyPr/>
           <a:lstStyle/>
           <a:p>
             <a:r>
-              <a:rPr lang="en-US" spc="0" dirty="0"/>
-              <a:t>Once you finish and have submitted your exercise in Canvas via a </a:t>
-            </a:r>
-            <a:r>
-              <a:rPr lang="en-US" spc="0" dirty="0" err="1"/>
-              <a:t>github</a:t>
-            </a:r>
-            <a:r>
-              <a:rPr lang="en-US" spc="0" dirty="0"/>
-              <a:t> link, use the remaining time to work on your group project. </a:t>
-            </a:r>
+              <a:rPr lang="en-US" dirty="0"/>
+              <a:t>Attendance word: </a:t>
+            </a:r>
+            <a:r>
+              <a:rPr lang="en-US" dirty="0" err="1"/>
+              <a:t>DivineDBA</a:t>
+            </a:r>
+            <a:endParaRPr lang="en-US" dirty="0"/>
+          </a:p>
+          <a:p>
+            <a:endParaRPr lang="en-US" dirty="0">
+              <a:solidFill>
+                <a:schemeClr val="tx1"/>
+              </a:solidFill>
+            </a:endParaRPr>
           </a:p>
         </p:txBody>
       </p:sp>
     </p:spTree>
     <p:extLst>
       <p:ext uri="{BB962C8B-B14F-4D97-AF65-F5344CB8AC3E}">
-        <p14:creationId xmlns:p14="http://schemas.microsoft.com/office/powerpoint/2010/main" val="656484464"/>
+        <p14:creationId xmlns:p14="http://schemas.microsoft.com/office/powerpoint/2010/main" val="3877287137"/>
       </p:ext>
     </p:extLst>
   </p:cSld>

</xml_diff>

<commit_message>
week 8 basic stats notebook
</commit_message>
<xml_diff>
--- a/course_material/week_08/week_08_presentation.pptx
+++ b/course_material/week_08/week_08_presentation.pptx
@@ -10,8 +10,8 @@
   <p:sldIdLst>
     <p:sldId id="256" r:id="rId2"/>
     <p:sldId id="274" r:id="rId3"/>
-    <p:sldId id="306" r:id="rId4"/>
-    <p:sldId id="259" r:id="rId5"/>
+    <p:sldId id="259" r:id="rId4"/>
+    <p:sldId id="306" r:id="rId5"/>
     <p:sldId id="262" r:id="rId6"/>
     <p:sldId id="304" r:id="rId7"/>
     <p:sldId id="302" r:id="rId8"/>
@@ -1833,7 +1833,7 @@
           <a:p>
             <a:fld id="{5CF9EFDB-215C-4120-ADCB-EAD745B7163E}" type="datetimeFigureOut">
               <a:rPr lang="en-US" smtClean="0"/>
-              <a:t>10/30/2021</a:t>
+              <a:t>11/2/2021</a:t>
             </a:fld>
             <a:endParaRPr lang="en-US"/>
           </a:p>
@@ -2294,7 +2294,7 @@
           <a:p>
             <a:fld id="{ACF1A1B0-862D-4909-A7DB-D8ADA062DFCA}" type="datetimeFigureOut">
               <a:rPr lang="en-US" dirty="0"/>
-              <a:t>10/30/2021</a:t>
+              <a:t>11/2/2021</a:t>
             </a:fld>
             <a:endParaRPr lang="en-US"/>
           </a:p>
@@ -2517,7 +2517,7 @@
           <a:p>
             <a:fld id="{7B156144-9CB7-4E3A-B87E-A382F9BE05EF}" type="datetimeFigureOut">
               <a:rPr lang="en-US" dirty="0"/>
-              <a:t>10/30/2021</a:t>
+              <a:t>11/2/2021</a:t>
             </a:fld>
             <a:endParaRPr lang="en-US"/>
           </a:p>
@@ -2695,7 +2695,7 @@
           <a:p>
             <a:fld id="{2643D55F-46AB-4791-9172-4FA8DD3A6A9C}" type="datetimeFigureOut">
               <a:rPr lang="en-US" dirty="0"/>
-              <a:t>10/30/2021</a:t>
+              <a:t>11/2/2021</a:t>
             </a:fld>
             <a:endParaRPr lang="en-US"/>
           </a:p>
@@ -2863,7 +2863,7 @@
           <a:p>
             <a:fld id="{58026881-8A08-449C-8D73-E5F201F814C1}" type="datetimeFigureOut">
               <a:rPr lang="en-US" dirty="0"/>
-              <a:t>10/30/2021</a:t>
+              <a:t>11/2/2021</a:t>
             </a:fld>
             <a:endParaRPr lang="en-US"/>
           </a:p>
@@ -3153,7 +3153,7 @@
           <a:p>
             <a:fld id="{1BEB5A5E-0C07-4E93-A112-D37B4D166B30}" type="datetimeFigureOut">
               <a:rPr lang="en-US" dirty="0"/>
-              <a:t>10/30/2021</a:t>
+              <a:t>11/2/2021</a:t>
             </a:fld>
             <a:endParaRPr lang="en-US"/>
           </a:p>
@@ -3476,7 +3476,7 @@
           <a:p>
             <a:fld id="{9E1F71C5-DC57-4358-A1EA-30C08AF6E3C5}" type="datetimeFigureOut">
               <a:rPr lang="en-US" dirty="0"/>
-              <a:t>10/30/2021</a:t>
+              <a:t>11/2/2021</a:t>
             </a:fld>
             <a:endParaRPr lang="en-US"/>
           </a:p>
@@ -3885,7 +3885,7 @@
           <a:p>
             <a:fld id="{12571DBA-DE60-4731-B773-47AAA185C143}" type="datetimeFigureOut">
               <a:rPr lang="en-US" dirty="0"/>
-              <a:t>10/30/2021</a:t>
+              <a:t>11/2/2021</a:t>
             </a:fld>
             <a:endParaRPr lang="en-US"/>
           </a:p>
@@ -4002,7 +4002,7 @@
           <a:p>
             <a:fld id="{4F170639-886C-4FCF-9EAB-ABB5DA3F3F4A}" type="datetimeFigureOut">
               <a:rPr lang="en-US" dirty="0"/>
-              <a:t>10/30/2021</a:t>
+              <a:t>11/2/2021</a:t>
             </a:fld>
             <a:endParaRPr lang="en-US"/>
           </a:p>
@@ -4097,7 +4097,7 @@
           <a:p>
             <a:fld id="{34C4A628-C83B-4C66-83F4-1711CE3738FD}" type="datetimeFigureOut">
               <a:rPr lang="en-US" dirty="0"/>
-              <a:t>10/30/2021</a:t>
+              <a:t>11/2/2021</a:t>
             </a:fld>
             <a:endParaRPr lang="en-US"/>
           </a:p>
@@ -4382,7 +4382,7 @@
           <a:p>
             <a:fld id="{B88C1D73-9400-43CA-A37F-F9B7D00DE14C}" type="datetimeFigureOut">
               <a:rPr lang="en-US" dirty="0"/>
-              <a:t>10/30/2021</a:t>
+              <a:t>11/2/2021</a:t>
             </a:fld>
             <a:endParaRPr lang="en-US"/>
           </a:p>
@@ -4654,7 +4654,7 @@
           <a:p>
             <a:fld id="{188B7711-B905-4633-B4D7-6F3A49A2E7D9}" type="datetimeFigureOut">
               <a:rPr lang="en-US" dirty="0"/>
-              <a:t>10/30/2021</a:t>
+              <a:t>11/2/2021</a:t>
             </a:fld>
             <a:endParaRPr lang="en-US"/>
           </a:p>
@@ -4904,7 +4904,7 @@
             <a:fld id="{89C235CF-BDA2-4E7E-8BBD-350479985E74}" type="datetimeFigureOut">
               <a:rPr lang="en-US" dirty="0"/>
               <a:pPr/>
-              <a:t>10/30/2021</a:t>
+              <a:t>11/2/2021</a:t>
             </a:fld>
             <a:endParaRPr lang="en-US"/>
           </a:p>
@@ -5773,7 +5773,7 @@
           <p:cNvPr id="2" name="Title 1">
             <a:extLst>
               <a:ext uri="{FF2B5EF4-FFF2-40B4-BE49-F238E27FC236}">
-                <a16:creationId xmlns:a16="http://schemas.microsoft.com/office/drawing/2014/main" id="{9D048B1D-4FC6-4A5E-B3F9-5FCAC8A2FF9F}"/>
+                <a16:creationId xmlns:a16="http://schemas.microsoft.com/office/drawing/2014/main" id="{4B6EB97C-9C9E-4774-B618-710FC677AD19}"/>
               </a:ext>
             </a:extLst>
           </p:cNvPr>
@@ -5784,14 +5784,19 @@
             <p:ph type="title"/>
           </p:nvPr>
         </p:nvSpPr>
-        <p:spPr/>
+        <p:spPr>
+          <a:xfrm>
+            <a:off x="80344" y="40412"/>
+            <a:ext cx="9692640" cy="769046"/>
+          </a:xfrm>
+        </p:spPr>
         <p:txBody>
           <a:bodyPr/>
           <a:lstStyle/>
           <a:p>
             <a:r>
               <a:rPr lang="en-US" dirty="0"/>
-              <a:t>Class Expectations	</a:t>
+              <a:t>Today's Activities</a:t>
             </a:r>
           </a:p>
         </p:txBody>
@@ -5801,7 +5806,7 @@
           <p:cNvPr id="3" name="Content Placeholder 2">
             <a:extLst>
               <a:ext uri="{FF2B5EF4-FFF2-40B4-BE49-F238E27FC236}">
-                <a16:creationId xmlns:a16="http://schemas.microsoft.com/office/drawing/2014/main" id="{FD545EEE-4C81-4EC1-9BF8-C3265C98C20E}"/>
+                <a16:creationId xmlns:a16="http://schemas.microsoft.com/office/drawing/2014/main" id="{A94ED92E-9B1F-48CA-A2B2-FF65221C2F5D}"/>
               </a:ext>
             </a:extLst>
           </p:cNvPr>
@@ -5812,43 +5817,54 @@
             <p:ph idx="1"/>
           </p:nvPr>
         </p:nvSpPr>
-        <p:spPr/>
-        <p:txBody>
-          <a:bodyPr/>
+        <p:spPr>
+          <a:xfrm>
+            <a:off x="696793" y="981182"/>
+            <a:ext cx="9400168" cy="5507179"/>
+          </a:xfrm>
+        </p:spPr>
+        <p:txBody>
+          <a:bodyPr vert="horz" lIns="91440" tIns="45720" rIns="91440" bIns="45720" rtlCol="0" anchor="t">
+            <a:normAutofit/>
+          </a:bodyPr>
           <a:lstStyle/>
           <a:p>
             <a:r>
               <a:rPr lang="en-US" dirty="0"/>
-              <a:t>Homework assignments – each assignment needs to have 70% or higher</a:t>
-            </a:r>
-          </a:p>
-          <a:p>
-            <a:pPr lvl="1"/>
+              <a:t>Warmup (10 mins)</a:t>
+            </a:r>
+          </a:p>
+          <a:p>
             <a:r>
               <a:rPr lang="en-US" dirty="0"/>
-              <a:t>You are allowed to miss one assignment in the class, and if you have below 70% on an assignment that will count as your freebie.</a:t>
+              <a:t>Homework Answers/Q&amp;A (20 mins)</a:t>
             </a:r>
           </a:p>
           <a:p>
             <a:r>
               <a:rPr lang="en-US" dirty="0"/>
-              <a:t>In-class assignments – you need to have 70% average or higher at each checkpoint</a:t>
-            </a:r>
-          </a:p>
-          <a:p>
-            <a:pPr lvl="1"/>
+              <a:t>Basic Statistics in Python (45 mins)</a:t>
+            </a:r>
+          </a:p>
+          <a:p>
             <a:r>
               <a:rPr lang="en-US" dirty="0"/>
-              <a:t>So, yes… you can achieve this and still miss one or so if you </a:t>
-            </a:r>
-            <a:r>
-              <a:rPr lang="en-US"/>
-              <a:t>do well on the rest</a:t>
-            </a:r>
-            <a:endParaRPr lang="en-US" dirty="0"/>
-          </a:p>
-          <a:p>
-            <a:pPr lvl="1"/>
+              <a:t>Break (15 mins)</a:t>
+            </a:r>
+          </a:p>
+          <a:p>
+            <a:r>
+              <a:rPr lang="en-US" dirty="0"/>
+              <a:t>Group Exercise (30 mins)</a:t>
+            </a:r>
+          </a:p>
+          <a:p>
+            <a:r>
+              <a:rPr lang="en-US" dirty="0"/>
+              <a:t>Work on Projects (60 mins)</a:t>
+            </a:r>
+          </a:p>
+          <a:p>
             <a:endParaRPr lang="en-US" dirty="0"/>
           </a:p>
         </p:txBody>
@@ -5856,7 +5872,7 @@
     </p:spTree>
     <p:extLst>
       <p:ext uri="{BB962C8B-B14F-4D97-AF65-F5344CB8AC3E}">
-        <p14:creationId xmlns:p14="http://schemas.microsoft.com/office/powerpoint/2010/main" val="202009757"/>
+        <p14:creationId xmlns:p14="http://schemas.microsoft.com/office/powerpoint/2010/main" val="2975521112"/>
       </p:ext>
     </p:extLst>
   </p:cSld>
@@ -5888,7 +5904,7 @@
           <p:cNvPr id="2" name="Title 1">
             <a:extLst>
               <a:ext uri="{FF2B5EF4-FFF2-40B4-BE49-F238E27FC236}">
-                <a16:creationId xmlns:a16="http://schemas.microsoft.com/office/drawing/2014/main" id="{4B6EB97C-9C9E-4774-B618-710FC677AD19}"/>
+                <a16:creationId xmlns:a16="http://schemas.microsoft.com/office/drawing/2014/main" id="{9D048B1D-4FC6-4A5E-B3F9-5FCAC8A2FF9F}"/>
               </a:ext>
             </a:extLst>
           </p:cNvPr>
@@ -5899,19 +5915,14 @@
             <p:ph type="title"/>
           </p:nvPr>
         </p:nvSpPr>
-        <p:spPr>
-          <a:xfrm>
-            <a:off x="80344" y="40412"/>
-            <a:ext cx="9692640" cy="769046"/>
-          </a:xfrm>
-        </p:spPr>
+        <p:spPr/>
         <p:txBody>
           <a:bodyPr/>
           <a:lstStyle/>
           <a:p>
             <a:r>
               <a:rPr lang="en-US" dirty="0"/>
-              <a:t>Today's Activities</a:t>
+              <a:t>Class Expectations	</a:t>
             </a:r>
           </a:p>
         </p:txBody>
@@ -5921,7 +5932,7 @@
           <p:cNvPr id="3" name="Content Placeholder 2">
             <a:extLst>
               <a:ext uri="{FF2B5EF4-FFF2-40B4-BE49-F238E27FC236}">
-                <a16:creationId xmlns:a16="http://schemas.microsoft.com/office/drawing/2014/main" id="{A94ED92E-9B1F-48CA-A2B2-FF65221C2F5D}"/>
+                <a16:creationId xmlns:a16="http://schemas.microsoft.com/office/drawing/2014/main" id="{FD545EEE-4C81-4EC1-9BF8-C3265C98C20E}"/>
               </a:ext>
             </a:extLst>
           </p:cNvPr>
@@ -5932,54 +5943,43 @@
             <p:ph idx="1"/>
           </p:nvPr>
         </p:nvSpPr>
-        <p:spPr>
-          <a:xfrm>
-            <a:off x="696793" y="981182"/>
-            <a:ext cx="9400168" cy="5507179"/>
-          </a:xfrm>
-        </p:spPr>
-        <p:txBody>
-          <a:bodyPr vert="horz" lIns="91440" tIns="45720" rIns="91440" bIns="45720" rtlCol="0" anchor="t">
-            <a:normAutofit/>
-          </a:bodyPr>
+        <p:spPr/>
+        <p:txBody>
+          <a:bodyPr/>
           <a:lstStyle/>
           <a:p>
             <a:r>
               <a:rPr lang="en-US" dirty="0"/>
-              <a:t>Warmup (10 mins)</a:t>
-            </a:r>
-          </a:p>
-          <a:p>
+              <a:t>Homework assignments – each assignment needs to have 70% or higher</a:t>
+            </a:r>
+          </a:p>
+          <a:p>
+            <a:pPr lvl="1"/>
             <a:r>
               <a:rPr lang="en-US" dirty="0"/>
-              <a:t>Homework Answers/Q&amp;A (20 mins)</a:t>
+              <a:t>You are allowed to miss one assignment in the class, and if you have below 70% on an assignment that will count as your freebie.</a:t>
             </a:r>
           </a:p>
           <a:p>
             <a:r>
               <a:rPr lang="en-US" dirty="0"/>
-              <a:t>Basic Statistics in Python (45 mins)</a:t>
-            </a:r>
-          </a:p>
-          <a:p>
+              <a:t>In-class assignments – you need to have 70% average or higher at each checkpoint</a:t>
+            </a:r>
+          </a:p>
+          <a:p>
+            <a:pPr lvl="1"/>
             <a:r>
               <a:rPr lang="en-US" dirty="0"/>
-              <a:t>Break (15 mins)</a:t>
-            </a:r>
-          </a:p>
-          <a:p>
-            <a:r>
-              <a:rPr lang="en-US" dirty="0"/>
-              <a:t>Group Exercise (30 mins)</a:t>
-            </a:r>
-          </a:p>
-          <a:p>
-            <a:r>
-              <a:rPr lang="en-US" dirty="0"/>
-              <a:t>Work on Projects (60 mins)</a:t>
-            </a:r>
-          </a:p>
-          <a:p>
+              <a:t>So, yes… you can achieve this and still miss one or so if you </a:t>
+            </a:r>
+            <a:r>
+              <a:rPr lang="en-US"/>
+              <a:t>do well on the rest</a:t>
+            </a:r>
+            <a:endParaRPr lang="en-US" dirty="0"/>
+          </a:p>
+          <a:p>
+            <a:pPr lvl="1"/>
             <a:endParaRPr lang="en-US" dirty="0"/>
           </a:p>
         </p:txBody>
@@ -5987,7 +5987,7 @@
     </p:spTree>
     <p:extLst>
       <p:ext uri="{BB962C8B-B14F-4D97-AF65-F5344CB8AC3E}">
-        <p14:creationId xmlns:p14="http://schemas.microsoft.com/office/powerpoint/2010/main" val="2975521112"/>
+        <p14:creationId xmlns:p14="http://schemas.microsoft.com/office/powerpoint/2010/main" val="202009757"/>
       </p:ext>
     </p:extLst>
   </p:cSld>
@@ -6695,7 +6695,7 @@
           <a:bodyPr/>
           <a:lstStyle/>
           <a:p>
-            <a:endParaRPr lang="en-US"/>
+            <a:endParaRPr lang="en-US" dirty="0"/>
           </a:p>
         </p:txBody>
       </p:sp>
@@ -6744,6 +6744,81 @@
           </a:extLst>
         </p:spPr>
       </p:pic>
+      <p:sp>
+        <p:nvSpPr>
+          <p:cNvPr id="4" name="AutoShape 2" descr="r =\frac{\sum\left(x_{i}-\bar{x}\right)\left(y_{i}-\bar{y}\right)}{\sqrt{\sum\left(x_{i}-\bar{x}\right)^{2} \sum\left(y_{i}-\bar{y}\right)^{2}}}">
+            <a:extLst>
+              <a:ext uri="{FF2B5EF4-FFF2-40B4-BE49-F238E27FC236}">
+                <a16:creationId xmlns:a16="http://schemas.microsoft.com/office/drawing/2014/main" id="{AD9C08BF-2F5C-4B2C-ACE1-277031EB1BCC}"/>
+              </a:ext>
+            </a:extLst>
+          </p:cNvPr>
+          <p:cNvSpPr>
+            <a:spLocks noChangeAspect="1" noChangeArrowheads="1"/>
+          </p:cNvSpPr>
+          <p:nvPr/>
+        </p:nvSpPr>
+        <p:spPr bwMode="auto">
+          <a:xfrm>
+            <a:off x="5943599" y="3276599"/>
+            <a:ext cx="2633241" cy="2633241"/>
+          </a:xfrm>
+          <a:prstGeom prst="rect">
+            <a:avLst/>
+          </a:prstGeom>
+          <a:noFill/>
+          <a:extLst>
+            <a:ext uri="{909E8E84-426E-40DD-AFC4-6F175D3DCCD1}">
+              <a14:hiddenFill xmlns:a14="http://schemas.microsoft.com/office/drawing/2010/main">
+                <a:solidFill>
+                  <a:srgbClr val="FFFFFF"/>
+                </a:solidFill>
+              </a14:hiddenFill>
+            </a:ext>
+          </a:extLst>
+        </p:spPr>
+        <p:txBody>
+          <a:bodyPr vert="horz" wrap="square" lIns="91440" tIns="45720" rIns="91440" bIns="45720" numCol="1" anchor="t" anchorCtr="0" compatLnSpc="1">
+            <a:prstTxWarp prst="textNoShape">
+              <a:avLst/>
+            </a:prstTxWarp>
+          </a:bodyPr>
+          <a:lstStyle/>
+          <a:p>
+            <a:endParaRPr lang="en-US"/>
+          </a:p>
+        </p:txBody>
+      </p:sp>
+      <p:pic>
+        <p:nvPicPr>
+          <p:cNvPr id="6" name="Picture 5">
+            <a:extLst>
+              <a:ext uri="{FF2B5EF4-FFF2-40B4-BE49-F238E27FC236}">
+                <a16:creationId xmlns:a16="http://schemas.microsoft.com/office/drawing/2014/main" id="{DC435C0D-ADC3-4B0D-A7EF-E0BA14A58686}"/>
+              </a:ext>
+            </a:extLst>
+          </p:cNvPr>
+          <p:cNvPicPr>
+            <a:picLocks noChangeAspect="1"/>
+          </p:cNvPicPr>
+          <p:nvPr/>
+        </p:nvPicPr>
+        <p:blipFill>
+          <a:blip r:embed="rId3"/>
+          <a:stretch>
+            <a:fillRect/>
+          </a:stretch>
+        </p:blipFill>
+        <p:spPr>
+          <a:xfrm>
+            <a:off x="3443468" y="2823740"/>
+            <a:ext cx="3962400" cy="3086100"/>
+          </a:xfrm>
+          <a:prstGeom prst="rect">
+            <a:avLst/>
+          </a:prstGeom>
+        </p:spPr>
+      </p:pic>
     </p:spTree>
     <p:extLst>
       <p:ext uri="{BB962C8B-B14F-4D97-AF65-F5344CB8AC3E}">
@@ -6754,6 +6829,81 @@
   <p:clrMapOvr>
     <a:masterClrMapping/>
   </p:clrMapOvr>
+  <p:timing>
+    <p:tnLst>
+      <p:par>
+        <p:cTn id="1" dur="indefinite" restart="never" nodeType="tmRoot">
+          <p:childTnLst>
+            <p:seq concurrent="1" nextAc="seek">
+              <p:cTn id="2" dur="indefinite" nodeType="mainSeq">
+                <p:childTnLst>
+                  <p:par>
+                    <p:cTn id="3" fill="hold">
+                      <p:stCondLst>
+                        <p:cond delay="indefinite"/>
+                      </p:stCondLst>
+                      <p:childTnLst>
+                        <p:par>
+                          <p:cTn id="4" fill="hold">
+                            <p:stCondLst>
+                              <p:cond delay="0"/>
+                            </p:stCondLst>
+                            <p:childTnLst>
+                              <p:par>
+                                <p:cTn id="5" presetID="1" presetClass="entr" presetSubtype="0" fill="hold" nodeType="clickEffect">
+                                  <p:stCondLst>
+                                    <p:cond delay="0"/>
+                                  </p:stCondLst>
+                                  <p:childTnLst>
+                                    <p:set>
+                                      <p:cBhvr>
+                                        <p:cTn id="6" dur="1" fill="hold">
+                                          <p:stCondLst>
+                                            <p:cond delay="0"/>
+                                          </p:stCondLst>
+                                        </p:cTn>
+                                        <p:tgtEl>
+                                          <p:spTgt spid="6"/>
+                                        </p:tgtEl>
+                                        <p:attrNameLst>
+                                          <p:attrName>style.visibility</p:attrName>
+                                        </p:attrNameLst>
+                                      </p:cBhvr>
+                                      <p:to>
+                                        <p:strVal val="visible"/>
+                                      </p:to>
+                                    </p:set>
+                                  </p:childTnLst>
+                                </p:cTn>
+                              </p:par>
+                            </p:childTnLst>
+                          </p:cTn>
+                        </p:par>
+                      </p:childTnLst>
+                    </p:cTn>
+                  </p:par>
+                </p:childTnLst>
+              </p:cTn>
+              <p:prevCondLst>
+                <p:cond evt="onPrev" delay="0">
+                  <p:tgtEl>
+                    <p:sldTgt/>
+                  </p:tgtEl>
+                </p:cond>
+              </p:prevCondLst>
+              <p:nextCondLst>
+                <p:cond evt="onNext" delay="0">
+                  <p:tgtEl>
+                    <p:sldTgt/>
+                  </p:tgtEl>
+                </p:cond>
+              </p:nextCondLst>
+            </p:seq>
+          </p:childTnLst>
+        </p:cTn>
+      </p:par>
+    </p:tnLst>
+  </p:timing>
 </p:sld>
 </file>
 

</xml_diff>